<commit_message>
Added multiple TTP and threat actor idioms, minor updates to older idioms
</commit_message>
<xml_diff>
--- a/idioms/indicator/malware-hash/diagram.pptx
+++ b/idioms/indicator/malware-hash/diagram.pptx
@@ -288,7 +288,7 @@
           <a:p>
             <a:fld id="{13F24B86-36D2-4655-BE2F-98B661AC85E1}" type="datetimeFigureOut">
               <a:rPr lang="en-US" smtClean="0"/>
-              <a:t>3/19/2014</a:t>
+              <a:t>3/25/2014</a:t>
             </a:fld>
             <a:endParaRPr lang="en-US"/>
           </a:p>
@@ -458,7 +458,7 @@
           <a:p>
             <a:fld id="{13F24B86-36D2-4655-BE2F-98B661AC85E1}" type="datetimeFigureOut">
               <a:rPr lang="en-US" smtClean="0"/>
-              <a:t>3/19/2014</a:t>
+              <a:t>3/25/2014</a:t>
             </a:fld>
             <a:endParaRPr lang="en-US"/>
           </a:p>
@@ -638,7 +638,7 @@
           <a:p>
             <a:fld id="{13F24B86-36D2-4655-BE2F-98B661AC85E1}" type="datetimeFigureOut">
               <a:rPr lang="en-US" smtClean="0"/>
-              <a:t>3/19/2014</a:t>
+              <a:t>3/25/2014</a:t>
             </a:fld>
             <a:endParaRPr lang="en-US"/>
           </a:p>
@@ -808,7 +808,7 @@
           <a:p>
             <a:fld id="{13F24B86-36D2-4655-BE2F-98B661AC85E1}" type="datetimeFigureOut">
               <a:rPr lang="en-US" smtClean="0"/>
-              <a:t>3/19/2014</a:t>
+              <a:t>3/25/2014</a:t>
             </a:fld>
             <a:endParaRPr lang="en-US"/>
           </a:p>
@@ -1054,7 +1054,7 @@
           <a:p>
             <a:fld id="{13F24B86-36D2-4655-BE2F-98B661AC85E1}" type="datetimeFigureOut">
               <a:rPr lang="en-US" smtClean="0"/>
-              <a:t>3/19/2014</a:t>
+              <a:t>3/25/2014</a:t>
             </a:fld>
             <a:endParaRPr lang="en-US"/>
           </a:p>
@@ -1342,7 +1342,7 @@
           <a:p>
             <a:fld id="{13F24B86-36D2-4655-BE2F-98B661AC85E1}" type="datetimeFigureOut">
               <a:rPr lang="en-US" smtClean="0"/>
-              <a:t>3/19/2014</a:t>
+              <a:t>3/25/2014</a:t>
             </a:fld>
             <a:endParaRPr lang="en-US"/>
           </a:p>
@@ -1764,7 +1764,7 @@
           <a:p>
             <a:fld id="{13F24B86-36D2-4655-BE2F-98B661AC85E1}" type="datetimeFigureOut">
               <a:rPr lang="en-US" smtClean="0"/>
-              <a:t>3/19/2014</a:t>
+              <a:t>3/25/2014</a:t>
             </a:fld>
             <a:endParaRPr lang="en-US"/>
           </a:p>
@@ -1882,7 +1882,7 @@
           <a:p>
             <a:fld id="{13F24B86-36D2-4655-BE2F-98B661AC85E1}" type="datetimeFigureOut">
               <a:rPr lang="en-US" smtClean="0"/>
-              <a:t>3/19/2014</a:t>
+              <a:t>3/25/2014</a:t>
             </a:fld>
             <a:endParaRPr lang="en-US"/>
           </a:p>
@@ -1977,7 +1977,7 @@
           <a:p>
             <a:fld id="{13F24B86-36D2-4655-BE2F-98B661AC85E1}" type="datetimeFigureOut">
               <a:rPr lang="en-US" smtClean="0"/>
-              <a:t>3/19/2014</a:t>
+              <a:t>3/25/2014</a:t>
             </a:fld>
             <a:endParaRPr lang="en-US"/>
           </a:p>
@@ -2254,7 +2254,7 @@
           <a:p>
             <a:fld id="{13F24B86-36D2-4655-BE2F-98B661AC85E1}" type="datetimeFigureOut">
               <a:rPr lang="en-US" smtClean="0"/>
-              <a:t>3/19/2014</a:t>
+              <a:t>3/25/2014</a:t>
             </a:fld>
             <a:endParaRPr lang="en-US"/>
           </a:p>
@@ -2507,7 +2507,7 @@
           <a:p>
             <a:fld id="{13F24B86-36D2-4655-BE2F-98B661AC85E1}" type="datetimeFigureOut">
               <a:rPr lang="en-US" smtClean="0"/>
-              <a:t>3/19/2014</a:t>
+              <a:t>3/25/2014</a:t>
             </a:fld>
             <a:endParaRPr lang="en-US"/>
           </a:p>
@@ -2720,7 +2720,7 @@
           <a:p>
             <a:fld id="{13F24B86-36D2-4655-BE2F-98B661AC85E1}" type="datetimeFigureOut">
               <a:rPr lang="en-US" smtClean="0"/>
-              <a:t>3/19/2014</a:t>
+              <a:t>3/25/2014</a:t>
             </a:fld>
             <a:endParaRPr lang="en-US"/>
           </a:p>
@@ -3104,14 +3104,14 @@
           <p:nvPr>
             <p:extLst>
               <p:ext uri="{D42A27DB-BD31-4B8C-83A1-F6EECF244321}">
-                <p14:modId xmlns:p14="http://schemas.microsoft.com/office/powerpoint/2010/main" val="1222469459"/>
+                <p14:modId xmlns:p14="http://schemas.microsoft.com/office/powerpoint/2010/main" val="2131361195"/>
               </p:ext>
             </p:extLst>
           </p:nvPr>
         </p:nvGraphicFramePr>
         <p:xfrm>
           <a:off x="5943600" y="304800"/>
-          <a:ext cx="5056497" cy="2148840"/>
+          <a:ext cx="5056497" cy="1889760"/>
         </p:xfrm>
         <a:graphic>
           <a:graphicData uri="http://schemas.openxmlformats.org/drawingml/2006/table">
@@ -3599,12 +3599,28 @@
                     <a:lstStyle/>
                     <a:p>
                       <a:r>
-                        <a:rPr lang="en-US" sz="1100" i="0" dirty="0" smtClean="0">
+                        <a:rPr lang="en-US" sz="1100" b="0" i="0" dirty="0" smtClean="0">
                           <a:solidFill>
                             <a:schemeClr val="tx1"/>
                           </a:solidFill>
                         </a:rPr>
-                        <a:t>    Malware</a:t>
+                        <a:t>   </a:t>
+                      </a:r>
+                      <a:r>
+                        <a:rPr lang="en-US" sz="1100" b="0" i="0" dirty="0" smtClean="0">
+                          <a:solidFill>
+                            <a:schemeClr val="tx1"/>
+                          </a:solidFill>
+                        </a:rPr>
+                        <a:t> </a:t>
+                      </a:r>
+                      <a:r>
+                        <a:rPr lang="en-US" sz="1100" b="0" i="0" dirty="0" smtClean="0">
+                          <a:solidFill>
+                            <a:schemeClr val="tx1"/>
+                          </a:solidFill>
+                        </a:rPr>
+                        <a:t>Malware Instance</a:t>
                       </a:r>
                       <a:endParaRPr lang="en-US" sz="1100" b="0" i="0" dirty="0">
                         <a:solidFill>
@@ -3653,28 +3669,9 @@
                     <a:bodyPr/>
                     <a:lstStyle/>
                     <a:p>
-                      <a:pPr marL="0" marR="0" indent="0" algn="l" defTabSz="914400" rtl="0" eaLnBrk="1" fontAlgn="auto" latinLnBrk="0" hangingPunct="1">
-                        <a:lnSpc>
-                          <a:spcPct val="100000"/>
-                        </a:lnSpc>
-                        <a:spcBef>
-                          <a:spcPts val="0"/>
-                        </a:spcBef>
-                        <a:spcAft>
-                          <a:spcPts val="0"/>
-                        </a:spcAft>
-                        <a:buClrTx/>
-                        <a:buSzTx/>
-                        <a:buFontTx/>
-                        <a:buNone/>
-                        <a:tabLst/>
-                        <a:defRPr/>
-                      </a:pPr>
-                      <a:endParaRPr lang="en-US" sz="1100" dirty="0" smtClean="0">
+                      <a:endParaRPr lang="en-US" sz="1100" b="0" dirty="0" smtClean="0">
                         <a:solidFill>
-                          <a:schemeClr val="bg1">
-                            <a:lumMod val="50000"/>
-                          </a:schemeClr>
+                          <a:schemeClr val="tx1"/>
                         </a:solidFill>
                       </a:endParaRPr>
                     </a:p>
@@ -3737,7 +3734,23 @@
                             <a:schemeClr val="tx1"/>
                           </a:solidFill>
                         </a:rPr>
-                        <a:t>        Malware Instance</a:t>
+                        <a:t>   </a:t>
+                      </a:r>
+                      <a:r>
+                        <a:rPr lang="en-US" sz="1100" b="0" i="0" dirty="0" smtClean="0">
+                          <a:solidFill>
+                            <a:schemeClr val="tx1"/>
+                          </a:solidFill>
+                        </a:rPr>
+                        <a:t>     </a:t>
+                      </a:r>
+                      <a:r>
+                        <a:rPr lang="en-US" sz="1100" b="0" i="0" dirty="0" smtClean="0">
+                          <a:solidFill>
+                            <a:schemeClr val="tx1"/>
+                          </a:solidFill>
+                        </a:rPr>
+                        <a:t>Name</a:t>
                       </a:r>
                       <a:endParaRPr lang="en-US" sz="1100" b="0" i="0" dirty="0">
                         <a:solidFill>
@@ -3786,11 +3799,14 @@
                     <a:bodyPr/>
                     <a:lstStyle/>
                     <a:p>
-                      <a:endParaRPr lang="en-US" sz="1100" b="0" dirty="0" smtClean="0">
-                        <a:solidFill>
-                          <a:schemeClr val="tx1"/>
-                        </a:solidFill>
-                      </a:endParaRPr>
+                      <a:r>
+                        <a:rPr lang="en-US" sz="1100" b="0" dirty="0" smtClean="0">
+                          <a:solidFill>
+                            <a:schemeClr val="tx1"/>
+                          </a:solidFill>
+                        </a:rPr>
+                        <a:t>Poison Ivy</a:t>
+                      </a:r>
                     </a:p>
                   </a:txBody>
                   <a:tcPr>
@@ -3851,124 +3867,23 @@
                             <a:schemeClr val="tx1"/>
                           </a:solidFill>
                         </a:rPr>
-                        <a:t>            Name</a:t>
+                        <a:t>   </a:t>
                       </a:r>
-                      <a:endParaRPr lang="en-US" sz="1100" b="0" i="0" dirty="0">
-                        <a:solidFill>
-                          <a:schemeClr val="tx1"/>
-                        </a:solidFill>
-                      </a:endParaRPr>
-                    </a:p>
-                  </a:txBody>
-                  <a:tcPr>
-                    <a:lnL w="12700" cap="flat" cmpd="sng" algn="ctr">
-                      <a:solidFill>
-                        <a:schemeClr val="tx1"/>
-                      </a:solidFill>
-                      <a:prstDash val="solid"/>
-                      <a:round/>
-                      <a:headEnd type="none" w="med" len="med"/>
-                      <a:tailEnd type="none" w="med" len="med"/>
-                    </a:lnL>
-                    <a:lnR w="12700" cap="flat" cmpd="sng" algn="ctr">
-                      <a:solidFill>
-                        <a:schemeClr val="tx1"/>
-                      </a:solidFill>
-                      <a:prstDash val="solid"/>
-                      <a:round/>
-                      <a:headEnd type="none" w="med" len="med"/>
-                      <a:tailEnd type="none" w="med" len="med"/>
-                    </a:lnR>
-                    <a:lnT w="12700" cmpd="sng">
-                      <a:noFill/>
-                    </a:lnT>
-                    <a:lnB w="12700" cmpd="sng">
-                      <a:noFill/>
-                    </a:lnB>
-                    <a:lnTlToBr w="12700" cmpd="sng">
-                      <a:noFill/>
-                      <a:prstDash val="solid"/>
-                    </a:lnTlToBr>
-                    <a:lnBlToTr w="12700" cmpd="sng">
-                      <a:noFill/>
-                      <a:prstDash val="solid"/>
-                    </a:lnBlToTr>
-                  </a:tcPr>
-                </a:tc>
-                <a:tc gridSpan="2">
-                  <a:txBody>
-                    <a:bodyPr/>
-                    <a:lstStyle/>
-                    <a:p>
-                      <a:r>
-                        <a:rPr lang="en-US" sz="1100" b="0" dirty="0" smtClean="0">
-                          <a:solidFill>
-                            <a:schemeClr val="tx1"/>
-                          </a:solidFill>
-                        </a:rPr>
-                        <a:t>Poison Ivy</a:t>
-                      </a:r>
-                    </a:p>
-                  </a:txBody>
-                  <a:tcPr>
-                    <a:lnL w="12700" cap="flat" cmpd="sng" algn="ctr">
-                      <a:solidFill>
-                        <a:schemeClr val="tx1"/>
-                      </a:solidFill>
-                      <a:prstDash val="solid"/>
-                      <a:round/>
-                      <a:headEnd type="none" w="med" len="med"/>
-                      <a:tailEnd type="none" w="med" len="med"/>
-                    </a:lnL>
-                    <a:lnR w="12700" cap="flat" cmpd="sng" algn="ctr">
-                      <a:solidFill>
-                        <a:schemeClr val="tx1"/>
-                      </a:solidFill>
-                      <a:prstDash val="solid"/>
-                      <a:round/>
-                      <a:headEnd type="none" w="med" len="med"/>
-                      <a:tailEnd type="none" w="med" len="med"/>
-                    </a:lnR>
-                    <a:lnT w="12700" cmpd="sng">
-                      <a:noFill/>
-                    </a:lnT>
-                    <a:lnB w="12700" cmpd="sng">
-                      <a:noFill/>
-                    </a:lnB>
-                    <a:lnTlToBr w="12700" cmpd="sng">
-                      <a:noFill/>
-                      <a:prstDash val="solid"/>
-                    </a:lnTlToBr>
-                    <a:lnBlToTr w="12700" cmpd="sng">
-                      <a:noFill/>
-                      <a:prstDash val="solid"/>
-                    </a:lnBlToTr>
-                  </a:tcPr>
-                </a:tc>
-                <a:tc hMerge="1">
-                  <a:txBody>
-                    <a:bodyPr/>
-                    <a:lstStyle/>
-                    <a:p>
-                      <a:endParaRPr lang="en-US"/>
-                    </a:p>
-                  </a:txBody>
-                  <a:tcPr/>
-                </a:tc>
-              </a:tr>
-              <a:tr h="144405">
-                <a:tc>
-                  <a:txBody>
-                    <a:bodyPr/>
-                    <a:lstStyle/>
-                    <a:p>
                       <a:r>
                         <a:rPr lang="en-US" sz="1100" b="0" i="0" dirty="0" smtClean="0">
                           <a:solidFill>
                             <a:schemeClr val="tx1"/>
                           </a:solidFill>
                         </a:rPr>
-                        <a:t>            Type</a:t>
+                        <a:t>     </a:t>
+                      </a:r>
+                      <a:r>
+                        <a:rPr lang="en-US" sz="1100" b="0" i="0" dirty="0" smtClean="0">
+                          <a:solidFill>
+                            <a:schemeClr val="tx1"/>
+                          </a:solidFill>
+                        </a:rPr>
+                        <a:t>Type</a:t>
                       </a:r>
                       <a:endParaRPr lang="en-US" sz="1100" b="0" i="0" dirty="0">
                         <a:solidFill>
@@ -4315,7 +4230,6 @@
                         <a:rPr lang="en-US" sz="1100" dirty="0" smtClean="0"/>
                         <a:t>example:indicator-a932fcc6-e032-176c-126f-cb970a5a1ade</a:t>
                       </a:r>
-                      <a:endParaRPr lang="en-US" sz="1100" dirty="0" smtClean="0"/>
                     </a:p>
                   </a:txBody>
                   <a:tcPr>
@@ -4400,7 +4314,6 @@
                         <a:rPr lang="en-US" sz="1100" dirty="0" smtClean="0"/>
                         <a:t>File hash for Poison Ivy variant</a:t>
                       </a:r>
-                      <a:endParaRPr lang="en-US" sz="1100" dirty="0" smtClean="0"/>
                     </a:p>
                   </a:txBody>
                   <a:tcPr>
@@ -4958,11 +4871,7 @@
                     <a:p>
                       <a:r>
                         <a:rPr lang="en-US" sz="1100" b="0" dirty="0" smtClean="0"/>
-                        <a:t>            </a:t>
-                      </a:r>
-                      <a:r>
-                        <a:rPr lang="en-US" sz="1100" b="0" dirty="0" smtClean="0"/>
-                        <a:t>Hash</a:t>
+                        <a:t>            Hash</a:t>
                       </a:r>
                       <a:endParaRPr lang="en-US" sz="1100" b="0" dirty="0"/>
                     </a:p>
@@ -5102,11 +5011,7 @@
                     <a:p>
                       <a:r>
                         <a:rPr lang="en-US" sz="1100" b="0" dirty="0" smtClean="0"/>
-                        <a:t>                </a:t>
-                      </a:r>
-                      <a:r>
-                        <a:rPr lang="en-US" sz="1100" b="0" dirty="0" smtClean="0"/>
-                        <a:t>Type</a:t>
+                        <a:t>                Type</a:t>
                       </a:r>
                       <a:endParaRPr lang="en-US" sz="1100" b="0" dirty="0"/>
                     </a:p>
@@ -5141,7 +5046,6 @@
                         <a:rPr lang="en-US" sz="1100" b="0" dirty="0" smtClean="0"/>
                         <a:t>SHA256</a:t>
                       </a:r>
-                      <a:endParaRPr lang="en-US" sz="1100" b="0" dirty="0" smtClean="0"/>
                     </a:p>
                   </a:txBody>
                   <a:tcPr>
@@ -5201,13 +5105,6 @@
                         </a:rPr>
                         <a:t>HashNameVocab-1.0</a:t>
                       </a:r>
-                      <a:endParaRPr lang="en-US" sz="1100" b="0" dirty="0" smtClean="0">
-                        <a:solidFill>
-                          <a:schemeClr val="bg1">
-                            <a:lumMod val="50000"/>
-                          </a:schemeClr>
-                        </a:solidFill>
-                      </a:endParaRPr>
                     </a:p>
                   </a:txBody>
                   <a:tcPr>
@@ -5295,7 +5192,6 @@
                         <a:rPr lang="en-US" sz="1100" b="0" dirty="0" smtClean="0"/>
                         <a:t>ef537f25c895bfa782526529a9b63d97aa631564d5d789c2b765448c8635fb6c</a:t>
                       </a:r>
-                      <a:endParaRPr lang="en-US" sz="1100" b="0" dirty="0" smtClean="0"/>
                     </a:p>
                   </a:txBody>
                   <a:tcPr>
@@ -5441,7 +5337,6 @@
                         <a:rPr lang="en-US" sz="1100" b="0" dirty="0" smtClean="0"/>
                         <a:t>Equals</a:t>
                       </a:r>
-                      <a:endParaRPr lang="en-US" sz="1100" b="0" dirty="0" smtClean="0"/>
                     </a:p>
                   </a:txBody>
                   <a:tcPr>
@@ -5882,11 +5777,6 @@
                         </a:rPr>
                         <a:t>example:ttp-e610a4f1-9676-eab3-bcc6-b2768d58281a</a:t>
                       </a:r>
-                      <a:endParaRPr lang="en-US" sz="1100" b="0" dirty="0" smtClean="0">
-                        <a:solidFill>
-                          <a:schemeClr val="tx1"/>
-                        </a:solidFill>
-                      </a:endParaRPr>
                     </a:p>
                   </a:txBody>
                   <a:tcPr>

</xml_diff>